<commit_message>
Update command line session.
</commit_message>
<xml_diff>
--- a/extra/command-line.pptx
+++ b/extra/command-line.pptx
@@ -266,7 +266,7 @@
           <a:p>
             <a:fld id="{FDAA3A38-6435-9442-A310-D3B35A139931}" type="datetimeFigureOut">
               <a:rPr lang="en-US" smtClean="0"/>
-              <a:t>2/14/25</a:t>
+              <a:t>2/26/25</a:t>
             </a:fld>
             <a:endParaRPr lang="en-US"/>
           </a:p>
@@ -434,7 +434,7 @@
           <a:p>
             <a:fld id="{FDAA3A38-6435-9442-A310-D3B35A139931}" type="datetimeFigureOut">
               <a:rPr lang="en-US" smtClean="0"/>
-              <a:t>2/14/25</a:t>
+              <a:t>2/26/25</a:t>
             </a:fld>
             <a:endParaRPr lang="en-US"/>
           </a:p>
@@ -612,7 +612,7 @@
           <a:p>
             <a:fld id="{FDAA3A38-6435-9442-A310-D3B35A139931}" type="datetimeFigureOut">
               <a:rPr lang="en-US" smtClean="0"/>
-              <a:t>2/14/25</a:t>
+              <a:t>2/26/25</a:t>
             </a:fld>
             <a:endParaRPr lang="en-US"/>
           </a:p>
@@ -780,7 +780,7 @@
           <a:p>
             <a:fld id="{FDAA3A38-6435-9442-A310-D3B35A139931}" type="datetimeFigureOut">
               <a:rPr lang="en-US" smtClean="0"/>
-              <a:t>2/14/25</a:t>
+              <a:t>2/26/25</a:t>
             </a:fld>
             <a:endParaRPr lang="en-US"/>
           </a:p>
@@ -1025,7 +1025,7 @@
           <a:p>
             <a:fld id="{FDAA3A38-6435-9442-A310-D3B35A139931}" type="datetimeFigureOut">
               <a:rPr lang="en-US" smtClean="0"/>
-              <a:t>2/14/25</a:t>
+              <a:t>2/26/25</a:t>
             </a:fld>
             <a:endParaRPr lang="en-US"/>
           </a:p>
@@ -1254,7 +1254,7 @@
           <a:p>
             <a:fld id="{FDAA3A38-6435-9442-A310-D3B35A139931}" type="datetimeFigureOut">
               <a:rPr lang="en-US" smtClean="0"/>
-              <a:t>2/14/25</a:t>
+              <a:t>2/26/25</a:t>
             </a:fld>
             <a:endParaRPr lang="en-US"/>
           </a:p>
@@ -1618,7 +1618,7 @@
           <a:p>
             <a:fld id="{FDAA3A38-6435-9442-A310-D3B35A139931}" type="datetimeFigureOut">
               <a:rPr lang="en-US" smtClean="0"/>
-              <a:t>2/14/25</a:t>
+              <a:t>2/26/25</a:t>
             </a:fld>
             <a:endParaRPr lang="en-US"/>
           </a:p>
@@ -1735,7 +1735,7 @@
           <a:p>
             <a:fld id="{FDAA3A38-6435-9442-A310-D3B35A139931}" type="datetimeFigureOut">
               <a:rPr lang="en-US" smtClean="0"/>
-              <a:t>2/14/25</a:t>
+              <a:t>2/26/25</a:t>
             </a:fld>
             <a:endParaRPr lang="en-US"/>
           </a:p>
@@ -1830,7 +1830,7 @@
           <a:p>
             <a:fld id="{FDAA3A38-6435-9442-A310-D3B35A139931}" type="datetimeFigureOut">
               <a:rPr lang="en-US" smtClean="0"/>
-              <a:t>2/14/25</a:t>
+              <a:t>2/26/25</a:t>
             </a:fld>
             <a:endParaRPr lang="en-US"/>
           </a:p>
@@ -2105,7 +2105,7 @@
           <a:p>
             <a:fld id="{FDAA3A38-6435-9442-A310-D3B35A139931}" type="datetimeFigureOut">
               <a:rPr lang="en-US" smtClean="0"/>
-              <a:t>2/14/25</a:t>
+              <a:t>2/26/25</a:t>
             </a:fld>
             <a:endParaRPr lang="en-US"/>
           </a:p>
@@ -2357,7 +2357,7 @@
           <a:p>
             <a:fld id="{FDAA3A38-6435-9442-A310-D3B35A139931}" type="datetimeFigureOut">
               <a:rPr lang="en-US" smtClean="0"/>
-              <a:t>2/14/25</a:t>
+              <a:t>2/26/25</a:t>
             </a:fld>
             <a:endParaRPr lang="en-US"/>
           </a:p>
@@ -2568,7 +2568,7 @@
           <a:p>
             <a:fld id="{FDAA3A38-6435-9442-A310-D3B35A139931}" type="datetimeFigureOut">
               <a:rPr lang="en-US" smtClean="0"/>
-              <a:t>2/14/25</a:t>
+              <a:t>2/26/25</a:t>
             </a:fld>
             <a:endParaRPr lang="en-US"/>
           </a:p>
@@ -6404,7 +6404,7 @@
           <a:p>
             <a:r>
               <a:rPr lang="en-US" dirty="0"/>
-              <a:t>The example files (</a:t>
+              <a:t>The example files are </a:t>
             </a:r>
             <a:r>
               <a:rPr lang="en-US" dirty="0" err="1">
@@ -6430,14 +6430,6 @@
                 <a:cs typeface="Courier New" panose="02070309020205020404" pitchFamily="49" charset="0"/>
               </a:rPr>
               <a:t>development.txt</a:t>
-            </a:r>
-            <a:r>
-              <a:rPr lang="en-US" dirty="0"/>
-              <a:t>) are both available on </a:t>
-            </a:r>
-            <a:r>
-              <a:rPr lang="en-US" dirty="0" err="1"/>
-              <a:t>penelopeCloud</a:t>
             </a:r>
             <a:endParaRPr lang="en-US" dirty="0"/>
           </a:p>

</xml_diff>